<commit_message>
added notes about foss
</commit_message>
<xml_diff>
--- a/presentation.pptx
+++ b/presentation.pptx
@@ -10,7 +10,8 @@
     <p:sldId id="258" r:id="rId4"/>
     <p:sldId id="259" r:id="rId5"/>
     <p:sldId id="260" r:id="rId6"/>
-    <p:sldId id="261" r:id="rId7"/>
+    <p:sldId id="262" r:id="rId7"/>
+    <p:sldId id="261" r:id="rId8"/>
   </p:sldIdLst>
   <p:sldSz cx="12192000" cy="6858000"/>
   <p:notesSz cx="6858000" cy="9144000"/>
@@ -5801,6 +5802,13 @@
   <p:clrMapOvr>
     <a:masterClrMapping/>
   </p:clrMapOvr>
+  <p:timing>
+    <p:tnLst>
+      <p:par>
+        <p:cTn id="1" dur="indefinite" restart="never" nodeType="tmRoot"/>
+      </p:par>
+    </p:tnLst>
+  </p:timing>
 </p:sld>
 </file>
 
@@ -5963,6 +5971,13 @@
   <p:clrMapOvr>
     <a:masterClrMapping/>
   </p:clrMapOvr>
+  <p:timing>
+    <p:tnLst>
+      <p:par>
+        <p:cTn id="1" dur="indefinite" restart="never" nodeType="tmRoot"/>
+      </p:par>
+    </p:tnLst>
+  </p:timing>
 </p:sld>
 </file>
 
@@ -6078,6 +6093,13 @@
   <p:clrMapOvr>
     <a:masterClrMapping/>
   </p:clrMapOvr>
+  <p:timing>
+    <p:tnLst>
+      <p:par>
+        <p:cTn id="1" dur="indefinite" restart="never" nodeType="tmRoot"/>
+      </p:par>
+    </p:tnLst>
+  </p:timing>
 </p:sld>
 </file>
 
@@ -6176,6 +6198,13 @@
   <p:clrMapOvr>
     <a:masterClrMapping/>
   </p:clrMapOvr>
+  <p:timing>
+    <p:tnLst>
+      <p:par>
+        <p:cTn id="1" dur="indefinite" restart="never" nodeType="tmRoot"/>
+      </p:par>
+    </p:tnLst>
+  </p:timing>
 </p:sld>
 </file>
 
@@ -6283,6 +6312,13 @@
   <p:clrMapOvr>
     <a:masterClrMapping/>
   </p:clrMapOvr>
+  <p:timing>
+    <p:tnLst>
+      <p:par>
+        <p:cTn id="1" dur="indefinite" restart="never" nodeType="tmRoot"/>
+      </p:par>
+    </p:tnLst>
+  </p:timing>
 </p:sld>
 </file>
 
@@ -6310,6 +6346,139 @@
             <a:spLocks noGrp="1"/>
           </p:cNvSpPr>
           <p:nvPr>
+            <p:ph type="title"/>
+          </p:nvPr>
+        </p:nvSpPr>
+        <p:spPr/>
+        <p:txBody>
+          <a:bodyPr/>
+          <a:lstStyle/>
+          <a:p>
+            <a:r>
+              <a:rPr lang="en-US" dirty="0" smtClean="0"/>
+              <a:t>Project sustainability</a:t>
+            </a:r>
+            <a:endParaRPr lang="en-US" dirty="0"/>
+          </a:p>
+        </p:txBody>
+      </p:sp>
+      <p:sp>
+        <p:nvSpPr>
+          <p:cNvPr id="3" name="Content Placeholder 2"/>
+          <p:cNvSpPr>
+            <a:spLocks noGrp="1"/>
+          </p:cNvSpPr>
+          <p:nvPr>
+            <p:ph idx="1"/>
+          </p:nvPr>
+        </p:nvSpPr>
+        <p:spPr>
+          <a:xfrm>
+            <a:off x="685800" y="2194560"/>
+            <a:ext cx="7543800" cy="4024125"/>
+          </a:xfrm>
+        </p:spPr>
+        <p:txBody>
+          <a:bodyPr>
+            <a:normAutofit/>
+          </a:bodyPr>
+          <a:lstStyle/>
+          <a:p>
+            <a:r>
+              <a:rPr lang="en-US" sz="3600" dirty="0" smtClean="0"/>
+              <a:t>No licenses to worry about</a:t>
+            </a:r>
+          </a:p>
+          <a:p>
+            <a:r>
+              <a:rPr lang="en-US" sz="3600" dirty="0" smtClean="0"/>
+              <a:t>Uses Apache and MySQL</a:t>
+            </a:r>
+          </a:p>
+          <a:p>
+            <a:r>
+              <a:rPr lang="en-US" sz="3600" dirty="0" smtClean="0"/>
+              <a:t>Project built with free and open source software</a:t>
+            </a:r>
+          </a:p>
+          <a:p>
+            <a:r>
+              <a:rPr lang="en-US" sz="3600" dirty="0" smtClean="0"/>
+              <a:t>All technology available to set up and run at no cost</a:t>
+            </a:r>
+          </a:p>
+          <a:p>
+            <a:endParaRPr lang="en-US" sz="3600" dirty="0"/>
+          </a:p>
+        </p:txBody>
+      </p:sp>
+      <p:pic>
+        <p:nvPicPr>
+          <p:cNvPr id="4" name="Picture 3"/>
+          <p:cNvPicPr>
+            <a:picLocks noChangeAspect="1"/>
+          </p:cNvPicPr>
+          <p:nvPr/>
+        </p:nvPicPr>
+        <p:blipFill>
+          <a:blip r:embed="rId2">
+            <a:extLst>
+              <a:ext uri="{28A0092B-C50C-407E-A947-70E740481C1C}">
+                <a14:useLocalDpi xmlns:a14="http://schemas.microsoft.com/office/drawing/2010/main" val="0"/>
+              </a:ext>
+            </a:extLst>
+          </a:blip>
+          <a:stretch>
+            <a:fillRect/>
+          </a:stretch>
+        </p:blipFill>
+        <p:spPr>
+          <a:xfrm>
+            <a:off x="7635239" y="2451835"/>
+            <a:ext cx="5187617" cy="2042688"/>
+          </a:xfrm>
+          <a:prstGeom prst="rect">
+            <a:avLst/>
+          </a:prstGeom>
+        </p:spPr>
+      </p:pic>
+    </p:spTree>
+    <p:extLst>
+      <p:ext uri="{BB962C8B-B14F-4D97-AF65-F5344CB8AC3E}">
+        <p14:creationId xmlns:p14="http://schemas.microsoft.com/office/powerpoint/2010/main" val="1858843009"/>
+      </p:ext>
+    </p:extLst>
+  </p:cSld>
+  <p:clrMapOvr>
+    <a:masterClrMapping/>
+  </p:clrMapOvr>
+</p:sld>
+</file>
+
+<file path=ppt/slides/slide7.xml><?xml version="1.0" encoding="utf-8"?>
+<p:sld xmlns:a="http://schemas.openxmlformats.org/drawingml/2006/main" xmlns:r="http://schemas.openxmlformats.org/officeDocument/2006/relationships" xmlns:p="http://schemas.openxmlformats.org/presentationml/2006/main">
+  <p:cSld>
+    <p:spTree>
+      <p:nvGrpSpPr>
+        <p:cNvPr id="1" name=""/>
+        <p:cNvGrpSpPr/>
+        <p:nvPr/>
+      </p:nvGrpSpPr>
+      <p:grpSpPr>
+        <a:xfrm>
+          <a:off x="0" y="0"/>
+          <a:ext cx="0" cy="0"/>
+          <a:chOff x="0" y="0"/>
+          <a:chExt cx="0" cy="0"/>
+        </a:xfrm>
+      </p:grpSpPr>
+      <p:sp>
+        <p:nvSpPr>
+          <p:cNvPr id="2" name="Title 1"/>
+          <p:cNvSpPr>
+            <a:spLocks noGrp="1"/>
+          </p:cNvSpPr>
+          <p:nvPr>
             <p:ph type="ctrTitle"/>
           </p:nvPr>
         </p:nvSpPr>
@@ -6359,6 +6528,13 @@
   <p:clrMapOvr>
     <a:masterClrMapping/>
   </p:clrMapOvr>
+  <p:timing>
+    <p:tnLst>
+      <p:par>
+        <p:cTn id="1" dur="indefinite" restart="never" nodeType="tmRoot"/>
+      </p:par>
+    </p:tnLst>
+  </p:timing>
 </p:sld>
 </file>
 

</xml_diff>